<commit_message>
TODO in der Präsentation aufgelöst
</commit_message>
<xml_diff>
--- a/Sessions/Dominik- Hooks was ist das eigentlich/Hooks.pptx
+++ b/Sessions/Dominik- Hooks was ist das eigentlich/Hooks.pptx
@@ -3480,7 +3480,7 @@
           </a:prstGeom>
           <a:extLst>
             <a:ext uri="{FAA26D3D-D897-4be2-8F04-BA451C77F1D7}">
-              <ma14:placeholderFlag xmlns="" xmlns:wpc="http://schemas.microsoft.com/office/word/2010/wordprocessingCanvas" xmlns:mo="http://schemas.microsoft.com/office/mac/office/2008/main" xmlns:mc="http://schemas.openxmlformats.org/markup-compatibility/2006" xmlns:mv="urn:schemas-microsoft-com:mac:vml" xmlns:o="urn:schemas-microsoft-com:office:office" xmlns:m="http://schemas.openxmlformats.org/officeDocument/2006/math" xmlns:v="urn:schemas-microsoft-com:vml" xmlns:wp14="http://schemas.microsoft.com/office/word/2010/wordprocessingDrawing" xmlns:wp="http://schemas.openxmlformats.org/drawingml/2006/wordprocessingDrawing" xmlns:w10="urn:schemas-microsoft-com:office:word" xmlns:w="http://schemas.openxmlformats.org/wordprocessingml/2006/main" xmlns:w14="http://schemas.microsoft.com/office/word/2010/wordml" xmlns:w15="http://schemas.microsoft.com/office/word/2012/wordml" xmlns:wpg="http://schemas.microsoft.com/office/word/2010/wordprocessingGroup" xmlns:wpi="http://schemas.microsoft.com/office/word/2010/wordprocessingInk" xmlns:wne="http://schemas.microsoft.com/office/word/2006/wordml" xmlns:wps="http://schemas.microsoft.com/office/word/2010/wordprocessingShape" xmlns:pic="http://schemas.openxmlformats.org/drawingml/2006/picture" xmlns:ma14="http://schemas.microsoft.com/office/mac/drawingml/2011/main" xmlns:lc="http://schemas.openxmlformats.org/drawingml/2006/lockedCanvas"/>
+              <ma14:placeholderFlag xmlns:lc="http://schemas.openxmlformats.org/drawingml/2006/lockedCanvas" xmlns:ma14="http://schemas.microsoft.com/office/mac/drawingml/2011/main" xmlns:pic="http://schemas.openxmlformats.org/drawingml/2006/picture" xmlns:wps="http://schemas.microsoft.com/office/word/2010/wordprocessingShape" xmlns:wne="http://schemas.microsoft.com/office/word/2006/wordml" xmlns:wpi="http://schemas.microsoft.com/office/word/2010/wordprocessingInk" xmlns:wpg="http://schemas.microsoft.com/office/word/2010/wordprocessingGroup" xmlns:w15="http://schemas.microsoft.com/office/word/2012/wordml" xmlns:w14="http://schemas.microsoft.com/office/word/2010/wordml" xmlns:w="http://schemas.openxmlformats.org/wordprocessingml/2006/main" xmlns:w10="urn:schemas-microsoft-com:office:word" xmlns:wp="http://schemas.openxmlformats.org/drawingml/2006/wordprocessingDrawing" xmlns:wp14="http://schemas.microsoft.com/office/word/2010/wordprocessingDrawing" xmlns:v="urn:schemas-microsoft-com:vml" xmlns:m="http://schemas.openxmlformats.org/officeDocument/2006/math" xmlns:o="urn:schemas-microsoft-com:office:office" xmlns:mv="urn:schemas-microsoft-com:mac:vml" xmlns:mc="http://schemas.openxmlformats.org/markup-compatibility/2006" xmlns:mo="http://schemas.microsoft.com/office/mac/office/2008/main" xmlns:wpc="http://schemas.microsoft.com/office/word/2010/wordprocessingCanvas" xmlns=""/>
             </a:ext>
           </a:extLst>
         </p:spPr>
@@ -5275,7 +5275,7 @@
           </a:prstGeom>
           <a:extLst>
             <a:ext uri="{FAA26D3D-D897-4be2-8F04-BA451C77F1D7}">
-              <ma14:placeholderFlag xmlns="" xmlns:wpc="http://schemas.microsoft.com/office/word/2010/wordprocessingCanvas" xmlns:mo="http://schemas.microsoft.com/office/mac/office/2008/main" xmlns:mc="http://schemas.openxmlformats.org/markup-compatibility/2006" xmlns:mv="urn:schemas-microsoft-com:mac:vml" xmlns:o="urn:schemas-microsoft-com:office:office" xmlns:m="http://schemas.openxmlformats.org/officeDocument/2006/math" xmlns:v="urn:schemas-microsoft-com:vml" xmlns:wp14="http://schemas.microsoft.com/office/word/2010/wordprocessingDrawing" xmlns:wp="http://schemas.openxmlformats.org/drawingml/2006/wordprocessingDrawing" xmlns:w10="urn:schemas-microsoft-com:office:word" xmlns:w="http://schemas.openxmlformats.org/wordprocessingml/2006/main" xmlns:w14="http://schemas.microsoft.com/office/word/2010/wordml" xmlns:w15="http://schemas.microsoft.com/office/word/2012/wordml" xmlns:wpg="http://schemas.microsoft.com/office/word/2010/wordprocessingGroup" xmlns:wpi="http://schemas.microsoft.com/office/word/2010/wordprocessingInk" xmlns:wne="http://schemas.microsoft.com/office/word/2006/wordml" xmlns:wps="http://schemas.microsoft.com/office/word/2010/wordprocessingShape" xmlns:pic="http://schemas.openxmlformats.org/drawingml/2006/picture" xmlns:ma14="http://schemas.microsoft.com/office/mac/drawingml/2011/main" xmlns:lc="http://schemas.openxmlformats.org/drawingml/2006/lockedCanvas"/>
+              <ma14:placeholderFlag xmlns:lc="http://schemas.openxmlformats.org/drawingml/2006/lockedCanvas" xmlns:ma14="http://schemas.microsoft.com/office/mac/drawingml/2011/main" xmlns:pic="http://schemas.openxmlformats.org/drawingml/2006/picture" xmlns:wps="http://schemas.microsoft.com/office/word/2010/wordprocessingShape" xmlns:wne="http://schemas.microsoft.com/office/word/2006/wordml" xmlns:wpi="http://schemas.microsoft.com/office/word/2010/wordprocessingInk" xmlns:wpg="http://schemas.microsoft.com/office/word/2010/wordprocessingGroup" xmlns:w15="http://schemas.microsoft.com/office/word/2012/wordml" xmlns:w14="http://schemas.microsoft.com/office/word/2010/wordml" xmlns:w="http://schemas.openxmlformats.org/wordprocessingml/2006/main" xmlns:w10="urn:schemas-microsoft-com:office:word" xmlns:wp="http://schemas.openxmlformats.org/drawingml/2006/wordprocessingDrawing" xmlns:wp14="http://schemas.microsoft.com/office/word/2010/wordprocessingDrawing" xmlns:v="urn:schemas-microsoft-com:vml" xmlns:m="http://schemas.openxmlformats.org/officeDocument/2006/math" xmlns:o="urn:schemas-microsoft-com:office:office" xmlns:mv="urn:schemas-microsoft-com:mac:vml" xmlns:mc="http://schemas.openxmlformats.org/markup-compatibility/2006" xmlns:mo="http://schemas.microsoft.com/office/mac/office/2008/main" xmlns:wpc="http://schemas.microsoft.com/office/word/2010/wordprocessingCanvas" xmlns=""/>
             </a:ext>
           </a:extLst>
         </p:spPr>
@@ -11472,11 +11472,37 @@
             </a:pPr>
             <a:r>
               <a:rPr lang="en-GB" dirty="0"/>
-              <a:t>Overreacted </a:t>
+              <a:t>Wie man </a:t>
             </a:r>
             <a:r>
               <a:rPr lang="en-GB" dirty="0" err="1"/>
-              <a:t>hinzufügen</a:t>
+              <a:t>useEffect</a:t>
+            </a:r>
+            <a:r>
+              <a:rPr lang="en-GB" dirty="0"/>
+              <a:t> </a:t>
+            </a:r>
+            <a:r>
+              <a:rPr lang="en-GB" dirty="0" err="1"/>
+              <a:t>richtig</a:t>
+            </a:r>
+            <a:r>
+              <a:rPr lang="en-GB" dirty="0"/>
+              <a:t> </a:t>
+            </a:r>
+            <a:r>
+              <a:rPr lang="en-GB" dirty="0" err="1"/>
+              <a:t>verwendet</a:t>
+            </a:r>
+            <a:r>
+              <a:rPr lang="en-GB" dirty="0"/>
+              <a:t>: </a:t>
+            </a:r>
+            <a:r>
+              <a:rPr lang="de-DE">
+                <a:hlinkClick r:id="rId5"/>
+              </a:rPr>
+              <a:t>https://overreacted.io/a-complete-guide-to-useeffect/</a:t>
             </a:r>
             <a:endParaRPr lang="en-GB" dirty="0"/>
           </a:p>

</xml_diff>